<commit_message>
Latest changes in Git presentation
</commit_message>
<xml_diff>
--- a/Git Intro.pptx
+++ b/Git Intro.pptx
@@ -114,6 +114,11 @@
       </a:defRPr>
     </a:lvl9pPr>
   </p:defaultTextStyle>
+  <p:extLst>
+    <p:ext uri="{EFAFB233-063F-42B5-8137-9DF3F51BA10A}">
+      <p15:sldGuideLst xmlns:p15="http://schemas.microsoft.com/office/powerpoint/2012/main"/>
+    </p:ext>
+  </p:extLst>
 </p:presentation>
 </file>
 
@@ -452,7 +457,7 @@
           <a:p>
             <a:fld id="{DEC3134D-C424-46E1-A551-5F5061BF3934}" type="datetimeFigureOut">
               <a:rPr lang="bg-BG" smtClean="0"/>
-              <a:t>26.10.2023 г.</a:t>
+              <a:t>27.10.2023 г.</a:t>
             </a:fld>
             <a:endParaRPr lang="bg-BG"/>
           </a:p>
@@ -1540,7 +1545,7 @@
           <a:p>
             <a:fld id="{DEC3134D-C424-46E1-A551-5F5061BF3934}" type="datetimeFigureOut">
               <a:rPr lang="bg-BG" smtClean="0"/>
-              <a:t>26.10.2023 г.</a:t>
+              <a:t>27.10.2023 г.</a:t>
             </a:fld>
             <a:endParaRPr lang="bg-BG"/>
           </a:p>
@@ -2520,7 +2525,7 @@
           <a:p>
             <a:fld id="{DEC3134D-C424-46E1-A551-5F5061BF3934}" type="datetimeFigureOut">
               <a:rPr lang="bg-BG" smtClean="0"/>
-              <a:t>26.10.2023 г.</a:t>
+              <a:t>27.10.2023 г.</a:t>
             </a:fld>
             <a:endParaRPr lang="bg-BG"/>
           </a:p>
@@ -3654,7 +3659,7 @@
           <a:p>
             <a:fld id="{DEC3134D-C424-46E1-A551-5F5061BF3934}" type="datetimeFigureOut">
               <a:rPr lang="bg-BG" smtClean="0"/>
-              <a:t>26.10.2023 г.</a:t>
+              <a:t>27.10.2023 г.</a:t>
             </a:fld>
             <a:endParaRPr lang="bg-BG"/>
           </a:p>
@@ -4687,7 +4692,7 @@
           <a:p>
             <a:fld id="{DEC3134D-C424-46E1-A551-5F5061BF3934}" type="datetimeFigureOut">
               <a:rPr lang="bg-BG" smtClean="0"/>
-              <a:t>26.10.2023 г.</a:t>
+              <a:t>27.10.2023 г.</a:t>
             </a:fld>
             <a:endParaRPr lang="bg-BG"/>
           </a:p>
@@ -5347,7 +5352,7 @@
           <a:p>
             <a:fld id="{DEC3134D-C424-46E1-A551-5F5061BF3934}" type="datetimeFigureOut">
               <a:rPr lang="bg-BG" smtClean="0"/>
-              <a:t>26.10.2023 г.</a:t>
+              <a:t>27.10.2023 г.</a:t>
             </a:fld>
             <a:endParaRPr lang="bg-BG"/>
           </a:p>
@@ -6208,7 +6213,7 @@
           <a:p>
             <a:fld id="{DEC3134D-C424-46E1-A551-5F5061BF3934}" type="datetimeFigureOut">
               <a:rPr lang="bg-BG" smtClean="0"/>
-              <a:t>26.10.2023 г.</a:t>
+              <a:t>27.10.2023 г.</a:t>
             </a:fld>
             <a:endParaRPr lang="bg-BG"/>
           </a:p>
@@ -6398,7 +6403,7 @@
           <a:p>
             <a:fld id="{DEC3134D-C424-46E1-A551-5F5061BF3934}" type="datetimeFigureOut">
               <a:rPr lang="bg-BG" smtClean="0"/>
-              <a:t>26.10.2023 г.</a:t>
+              <a:t>27.10.2023 г.</a:t>
             </a:fld>
             <a:endParaRPr lang="bg-BG"/>
           </a:p>
@@ -7370,7 +7375,7 @@
           <a:p>
             <a:fld id="{DEC3134D-C424-46E1-A551-5F5061BF3934}" type="datetimeFigureOut">
               <a:rPr lang="bg-BG" smtClean="0"/>
-              <a:t>26.10.2023 г.</a:t>
+              <a:t>27.10.2023 г.</a:t>
             </a:fld>
             <a:endParaRPr lang="bg-BG"/>
           </a:p>
@@ -7581,7 +7586,7 @@
           <a:p>
             <a:fld id="{DEC3134D-C424-46E1-A551-5F5061BF3934}" type="datetimeFigureOut">
               <a:rPr lang="bg-BG" smtClean="0"/>
-              <a:t>26.10.2023 г.</a:t>
+              <a:t>27.10.2023 г.</a:t>
             </a:fld>
             <a:endParaRPr lang="bg-BG"/>
           </a:p>
@@ -8615,7 +8620,7 @@
           <a:p>
             <a:fld id="{DEC3134D-C424-46E1-A551-5F5061BF3934}" type="datetimeFigureOut">
               <a:rPr lang="bg-BG" smtClean="0"/>
-              <a:t>26.10.2023 г.</a:t>
+              <a:t>27.10.2023 г.</a:t>
             </a:fld>
             <a:endParaRPr lang="bg-BG"/>
           </a:p>
@@ -8887,7 +8892,7 @@
           <a:p>
             <a:fld id="{DEC3134D-C424-46E1-A551-5F5061BF3934}" type="datetimeFigureOut">
               <a:rPr lang="bg-BG" smtClean="0"/>
-              <a:t>26.10.2023 г.</a:t>
+              <a:t>27.10.2023 г.</a:t>
             </a:fld>
             <a:endParaRPr lang="bg-BG"/>
           </a:p>
@@ -9297,7 +9302,7 @@
           <a:p>
             <a:fld id="{DEC3134D-C424-46E1-A551-5F5061BF3934}" type="datetimeFigureOut">
               <a:rPr lang="bg-BG" smtClean="0"/>
-              <a:t>26.10.2023 г.</a:t>
+              <a:t>27.10.2023 г.</a:t>
             </a:fld>
             <a:endParaRPr lang="bg-BG"/>
           </a:p>
@@ -9424,7 +9429,7 @@
           <a:p>
             <a:fld id="{DEC3134D-C424-46E1-A551-5F5061BF3934}" type="datetimeFigureOut">
               <a:rPr lang="bg-BG" smtClean="0"/>
-              <a:t>26.10.2023 г.</a:t>
+              <a:t>27.10.2023 г.</a:t>
             </a:fld>
             <a:endParaRPr lang="bg-BG"/>
           </a:p>
@@ -9519,7 +9524,7 @@
           <a:p>
             <a:fld id="{DEC3134D-C424-46E1-A551-5F5061BF3934}" type="datetimeFigureOut">
               <a:rPr lang="bg-BG" smtClean="0"/>
-              <a:t>26.10.2023 г.</a:t>
+              <a:t>27.10.2023 г.</a:t>
             </a:fld>
             <a:endParaRPr lang="bg-BG"/>
           </a:p>
@@ -10600,7 +10605,7 @@
           <a:p>
             <a:fld id="{DEC3134D-C424-46E1-A551-5F5061BF3934}" type="datetimeFigureOut">
               <a:rPr lang="bg-BG" smtClean="0"/>
-              <a:t>26.10.2023 г.</a:t>
+              <a:t>27.10.2023 г.</a:t>
             </a:fld>
             <a:endParaRPr lang="bg-BG"/>
           </a:p>
@@ -11708,7 +11713,7 @@
           <a:p>
             <a:fld id="{DEC3134D-C424-46E1-A551-5F5061BF3934}" type="datetimeFigureOut">
               <a:rPr lang="bg-BG" smtClean="0"/>
-              <a:t>26.10.2023 г.</a:t>
+              <a:t>27.10.2023 г.</a:t>
             </a:fld>
             <a:endParaRPr lang="bg-BG"/>
           </a:p>
@@ -12705,7 +12710,7 @@
           <a:p>
             <a:fld id="{DEC3134D-C424-46E1-A551-5F5061BF3934}" type="datetimeFigureOut">
               <a:rPr lang="bg-BG" smtClean="0"/>
-              <a:t>26.10.2023 г.</a:t>
+              <a:t>27.10.2023 г.</a:t>
             </a:fld>
             <a:endParaRPr lang="bg-BG"/>
           </a:p>
@@ -13296,7 +13301,7 @@
                 <a:latin typeface="Arial" panose="020B0604020202020204" pitchFamily="34" charset="0"/>
                 <a:cs typeface="Arial" panose="020B0604020202020204" pitchFamily="34" charset="0"/>
               </a:rPr>
-              <a:t>Git and Azure DevOps</a:t>
+              <a:t>Git</a:t>
             </a:r>
             <a:endParaRPr lang="bg-BG" dirty="0">
               <a:latin typeface="Arial" panose="020B0604020202020204" pitchFamily="34" charset="0"/>
@@ -13333,44 +13338,8 @@
         </p:blipFill>
         <p:spPr>
           <a:xfrm>
-            <a:off x="2459661" y="4132922"/>
-            <a:ext cx="3075999" cy="1284229"/>
-          </a:xfrm>
-          <a:prstGeom prst="rect">
-            <a:avLst/>
-          </a:prstGeom>
-        </p:spPr>
-      </p:pic>
-      <p:pic>
-        <p:nvPicPr>
-          <p:cNvPr id="13" name="Picture 12" descr="A blue and white logo&#10;&#10;Description automatically generated">
-            <a:extLst>
-              <a:ext uri="{FF2B5EF4-FFF2-40B4-BE49-F238E27FC236}">
-                <a16:creationId xmlns:a16="http://schemas.microsoft.com/office/drawing/2014/main" id="{4F3DE851-C1AE-9CC2-D6FD-E16598BA5D5B}"/>
-              </a:ext>
-            </a:extLst>
-          </p:cNvPr>
-          <p:cNvPicPr>
-            <a:picLocks noChangeAspect="1"/>
-          </p:cNvPicPr>
-          <p:nvPr/>
-        </p:nvPicPr>
-        <p:blipFill>
-          <a:blip r:embed="rId3">
-            <a:extLst>
-              <a:ext uri="{28A0092B-C50C-407E-A947-70E740481C1C}">
-                <a14:useLocalDpi xmlns:a14="http://schemas.microsoft.com/office/drawing/2010/main" val="0"/>
-              </a:ext>
-            </a:extLst>
-          </a:blip>
-          <a:stretch>
-            <a:fillRect/>
-          </a:stretch>
-        </p:blipFill>
-        <p:spPr>
-          <a:xfrm>
-            <a:off x="5943468" y="3628756"/>
-            <a:ext cx="3668099" cy="2292563"/>
+            <a:off x="3680587" y="3243236"/>
+            <a:ext cx="4451885" cy="1858661"/>
           </a:xfrm>
           <a:prstGeom prst="rect">
             <a:avLst/>

</xml_diff>

<commit_message>
Git intro presentation - update
</commit_message>
<xml_diff>
--- a/Git Intro.pptx
+++ b/Git Intro.pptx
@@ -14816,8 +14816,19 @@
                 <a:latin typeface="Arial" panose="020B0604020202020204" pitchFamily="34" charset="0"/>
                 <a:cs typeface="Arial" panose="020B0604020202020204" pitchFamily="34" charset="0"/>
               </a:rPr>
-              <a:t>- get all new work from the remote central repository that is not in our local repository</a:t>
-            </a:r>
+              <a:t>- get all new work from the remote central repository that is not in our local repository and combine it </a:t>
+            </a:r>
+            <a:r>
+              <a:rPr lang="en-US">
+                <a:latin typeface="Arial" panose="020B0604020202020204" pitchFamily="34" charset="0"/>
+                <a:cs typeface="Arial" panose="020B0604020202020204" pitchFamily="34" charset="0"/>
+              </a:rPr>
+              <a:t>with our local work</a:t>
+            </a:r>
+            <a:endParaRPr lang="en-US" dirty="0">
+              <a:latin typeface="Arial" panose="020B0604020202020204" pitchFamily="34" charset="0"/>
+              <a:cs typeface="Arial" panose="020B0604020202020204" pitchFamily="34" charset="0"/>
+            </a:endParaRPr>
           </a:p>
           <a:p>
             <a:r>
@@ -15436,11 +15447,13 @@
         <p:spPr>
           <a:xfrm>
             <a:off x="710502" y="3291477"/>
-            <a:ext cx="4825158" cy="1707243"/>
+            <a:ext cx="5097174" cy="2054880"/>
           </a:xfrm>
         </p:spPr>
         <p:txBody>
-          <a:bodyPr/>
+          <a:bodyPr>
+            <a:normAutofit/>
+          </a:bodyPr>
           <a:lstStyle/>
           <a:p>
             <a:r>
@@ -15455,7 +15468,7 @@
                 <a:latin typeface="Arial" panose="020B0604020202020204" pitchFamily="34" charset="0"/>
                 <a:cs typeface="Arial" panose="020B0604020202020204" pitchFamily="34" charset="0"/>
               </a:rPr>
-              <a:t>- get all new work from the remote central repository that is not in our local repository</a:t>
+              <a:t>- get all new work from the remote central repository that is not in our local repository and combine with our local work.</a:t>
             </a:r>
           </a:p>
           <a:p>

</xml_diff>